<commit_message>
breast arterial calcification paper&share update
</commit_message>
<xml_diff>
--- a/Share/乳动脉硬化分割.pptx
+++ b/Share/乳动脉硬化分割.pptx
@@ -5,13 +5,14 @@
     <p:sldMasterId id="2147483648" r:id="rId1"/>
   </p:sldMasterIdLst>
   <p:notesMasterIdLst>
-    <p:notesMasterId r:id="rId6"/>
+    <p:notesMasterId r:id="rId7"/>
   </p:notesMasterIdLst>
   <p:sldIdLst>
     <p:sldId id="256" r:id="rId2"/>
     <p:sldId id="257" r:id="rId3"/>
     <p:sldId id="258" r:id="rId4"/>
     <p:sldId id="259" r:id="rId5"/>
+    <p:sldId id="260" r:id="rId6"/>
   </p:sldIdLst>
   <p:sldSz cx="12192000" cy="6858000"/>
   <p:notesSz cx="6858000" cy="9144000"/>
@@ -110,6 +111,11 @@
       </a:defRPr>
     </a:lvl9pPr>
   </p:defaultTextStyle>
+  <p:extLst>
+    <p:ext uri="{EFAFB233-063F-42B5-8137-9DF3F51BA10A}">
+      <p15:sldGuideLst xmlns:p15="http://schemas.microsoft.com/office/powerpoint/2012/main"/>
+    </p:ext>
+  </p:extLst>
 </p:presentation>
 </file>
 
@@ -195,7 +201,7 @@
           <a:p>
             <a:fld id="{3EAEEA59-8830-49F5-9749-720F3645F228}" type="datetimeFigureOut">
               <a:rPr lang="zh-CN" altLang="en-US" smtClean="0"/>
-              <a:t>2020/10/10</a:t>
+              <a:t>2020/10/11</a:t>
             </a:fld>
             <a:endParaRPr lang="zh-CN" altLang="en-US"/>
           </a:p>
@@ -693,7 +699,7 @@
           <a:p>
             <a:fld id="{18C8E384-989F-4B75-9DC3-690057E58E54}" type="datetimeFigureOut">
               <a:rPr lang="zh-CN" altLang="en-US" smtClean="0"/>
-              <a:t>2020/10/10</a:t>
+              <a:t>2020/10/11</a:t>
             </a:fld>
             <a:endParaRPr lang="zh-CN" altLang="en-US"/>
           </a:p>
@@ -891,7 +897,7 @@
           <a:p>
             <a:fld id="{18C8E384-989F-4B75-9DC3-690057E58E54}" type="datetimeFigureOut">
               <a:rPr lang="zh-CN" altLang="en-US" smtClean="0"/>
-              <a:t>2020/10/10</a:t>
+              <a:t>2020/10/11</a:t>
             </a:fld>
             <a:endParaRPr lang="zh-CN" altLang="en-US"/>
           </a:p>
@@ -1099,7 +1105,7 @@
           <a:p>
             <a:fld id="{18C8E384-989F-4B75-9DC3-690057E58E54}" type="datetimeFigureOut">
               <a:rPr lang="zh-CN" altLang="en-US" smtClean="0"/>
-              <a:t>2020/10/10</a:t>
+              <a:t>2020/10/11</a:t>
             </a:fld>
             <a:endParaRPr lang="zh-CN" altLang="en-US"/>
           </a:p>
@@ -1297,7 +1303,7 @@
           <a:p>
             <a:fld id="{18C8E384-989F-4B75-9DC3-690057E58E54}" type="datetimeFigureOut">
               <a:rPr lang="zh-CN" altLang="en-US" smtClean="0"/>
-              <a:t>2020/10/10</a:t>
+              <a:t>2020/10/11</a:t>
             </a:fld>
             <a:endParaRPr lang="zh-CN" altLang="en-US"/>
           </a:p>
@@ -1572,7 +1578,7 @@
           <a:p>
             <a:fld id="{18C8E384-989F-4B75-9DC3-690057E58E54}" type="datetimeFigureOut">
               <a:rPr lang="zh-CN" altLang="en-US" smtClean="0"/>
-              <a:t>2020/10/10</a:t>
+              <a:t>2020/10/11</a:t>
             </a:fld>
             <a:endParaRPr lang="zh-CN" altLang="en-US"/>
           </a:p>
@@ -1837,7 +1843,7 @@
           <a:p>
             <a:fld id="{18C8E384-989F-4B75-9DC3-690057E58E54}" type="datetimeFigureOut">
               <a:rPr lang="zh-CN" altLang="en-US" smtClean="0"/>
-              <a:t>2020/10/10</a:t>
+              <a:t>2020/10/11</a:t>
             </a:fld>
             <a:endParaRPr lang="zh-CN" altLang="en-US"/>
           </a:p>
@@ -2249,7 +2255,7 @@
           <a:p>
             <a:fld id="{18C8E384-989F-4B75-9DC3-690057E58E54}" type="datetimeFigureOut">
               <a:rPr lang="zh-CN" altLang="en-US" smtClean="0"/>
-              <a:t>2020/10/10</a:t>
+              <a:t>2020/10/11</a:t>
             </a:fld>
             <a:endParaRPr lang="zh-CN" altLang="en-US"/>
           </a:p>
@@ -2390,7 +2396,7 @@
           <a:p>
             <a:fld id="{18C8E384-989F-4B75-9DC3-690057E58E54}" type="datetimeFigureOut">
               <a:rPr lang="zh-CN" altLang="en-US" smtClean="0"/>
-              <a:t>2020/10/10</a:t>
+              <a:t>2020/10/11</a:t>
             </a:fld>
             <a:endParaRPr lang="zh-CN" altLang="en-US"/>
           </a:p>
@@ -2503,7 +2509,7 @@
           <a:p>
             <a:fld id="{18C8E384-989F-4B75-9DC3-690057E58E54}" type="datetimeFigureOut">
               <a:rPr lang="zh-CN" altLang="en-US" smtClean="0"/>
-              <a:t>2020/10/10</a:t>
+              <a:t>2020/10/11</a:t>
             </a:fld>
             <a:endParaRPr lang="zh-CN" altLang="en-US"/>
           </a:p>
@@ -2814,7 +2820,7 @@
           <a:p>
             <a:fld id="{18C8E384-989F-4B75-9DC3-690057E58E54}" type="datetimeFigureOut">
               <a:rPr lang="zh-CN" altLang="en-US" smtClean="0"/>
-              <a:t>2020/10/10</a:t>
+              <a:t>2020/10/11</a:t>
             </a:fld>
             <a:endParaRPr lang="zh-CN" altLang="en-US"/>
           </a:p>
@@ -3102,7 +3108,7 @@
           <a:p>
             <a:fld id="{18C8E384-989F-4B75-9DC3-690057E58E54}" type="datetimeFigureOut">
               <a:rPr lang="zh-CN" altLang="en-US" smtClean="0"/>
-              <a:t>2020/10/10</a:t>
+              <a:t>2020/10/11</a:t>
             </a:fld>
             <a:endParaRPr lang="zh-CN" altLang="en-US"/>
           </a:p>
@@ -3343,7 +3349,7 @@
           <a:p>
             <a:fld id="{18C8E384-989F-4B75-9DC3-690057E58E54}" type="datetimeFigureOut">
               <a:rPr lang="zh-CN" altLang="en-US" smtClean="0"/>
-              <a:t>2020/10/10</a:t>
+              <a:t>2020/10/11</a:t>
             </a:fld>
             <a:endParaRPr lang="zh-CN" altLang="en-US"/>
           </a:p>
@@ -4347,8 +4353,8 @@
           </a:prstGeom>
         </p:spPr>
       </p:pic>
-      <mc:AlternateContent xmlns:mc="http://schemas.openxmlformats.org/markup-compatibility/2006">
-        <mc:Choice xmlns:a14="http://schemas.microsoft.com/office/drawing/2010/main" Requires="a14">
+      <mc:AlternateContent xmlns:mc="http://schemas.openxmlformats.org/markup-compatibility/2006" xmlns:a14="http://schemas.microsoft.com/office/drawing/2010/main">
+        <mc:Choice Requires="a14">
           <p:sp>
             <p:nvSpPr>
               <p:cNvPr id="7" name="文本框 6">
@@ -4738,7 +4744,7 @@
             </p:txBody>
           </p:sp>
         </mc:Choice>
-        <mc:Fallback>
+        <mc:Fallback xmlns="">
           <p:sp>
             <p:nvSpPr>
               <p:cNvPr id="7" name="文本框 6">
@@ -5082,6 +5088,214 @@
     <p:extLst>
       <p:ext uri="{BB962C8B-B14F-4D97-AF65-F5344CB8AC3E}">
         <p14:creationId xmlns:p14="http://schemas.microsoft.com/office/powerpoint/2010/main" val="3946898666"/>
+      </p:ext>
+    </p:extLst>
+  </p:cSld>
+  <p:clrMapOvr>
+    <a:masterClrMapping/>
+  </p:clrMapOvr>
+</p:sld>
+</file>
+
+<file path=ppt/slides/slide5.xml><?xml version="1.0" encoding="utf-8"?>
+<p:sld xmlns:a="http://schemas.openxmlformats.org/drawingml/2006/main" xmlns:r="http://schemas.openxmlformats.org/officeDocument/2006/relationships" xmlns:p="http://schemas.openxmlformats.org/presentationml/2006/main">
+  <p:cSld>
+    <p:spTree>
+      <p:nvGrpSpPr>
+        <p:cNvPr id="1" name=""/>
+        <p:cNvGrpSpPr/>
+        <p:nvPr/>
+      </p:nvGrpSpPr>
+      <p:grpSpPr>
+        <a:xfrm>
+          <a:off x="0" y="0"/>
+          <a:ext cx="0" cy="0"/>
+          <a:chOff x="0" y="0"/>
+          <a:chExt cx="0" cy="0"/>
+        </a:xfrm>
+      </p:grpSpPr>
+      <p:sp>
+        <p:nvSpPr>
+          <p:cNvPr id="2" name="标题 1">
+            <a:extLst>
+              <a:ext uri="{FF2B5EF4-FFF2-40B4-BE49-F238E27FC236}">
+                <a16:creationId xmlns:a16="http://schemas.microsoft.com/office/drawing/2014/main" id="{B32A29F5-0705-4CA7-B679-310BA6CC3347}"/>
+              </a:ext>
+            </a:extLst>
+          </p:cNvPr>
+          <p:cNvSpPr>
+            <a:spLocks noGrp="1"/>
+          </p:cNvSpPr>
+          <p:nvPr>
+            <p:ph type="title"/>
+          </p:nvPr>
+        </p:nvSpPr>
+        <p:spPr>
+          <a:xfrm>
+            <a:off x="838200" y="524923"/>
+            <a:ext cx="10515600" cy="1325563"/>
+          </a:xfrm>
+        </p:spPr>
+        <p:txBody>
+          <a:bodyPr/>
+          <a:lstStyle/>
+          <a:p>
+            <a:r>
+              <a:rPr lang="en-US" altLang="zh-CN" sz="2800" dirty="0"/>
+              <a:t>Benefit</a:t>
+            </a:r>
+            <a:r>
+              <a:rPr lang="zh-CN" altLang="en-US" sz="2800" dirty="0"/>
+              <a:t>：</a:t>
+            </a:r>
+            <a:br>
+              <a:rPr lang="en-US" altLang="zh-CN" sz="2800" dirty="0"/>
+            </a:br>
+            <a:endParaRPr lang="zh-CN" altLang="en-US" sz="2800" dirty="0"/>
+          </a:p>
+        </p:txBody>
+      </p:sp>
+      <p:sp>
+        <p:nvSpPr>
+          <p:cNvPr id="4" name="标题 1">
+            <a:extLst>
+              <a:ext uri="{FF2B5EF4-FFF2-40B4-BE49-F238E27FC236}">
+                <a16:creationId xmlns:a16="http://schemas.microsoft.com/office/drawing/2014/main" id="{342F711B-2AFC-4154-88A7-F4C33BD88D54}"/>
+              </a:ext>
+            </a:extLst>
+          </p:cNvPr>
+          <p:cNvSpPr txBox="1">
+            <a:spLocks/>
+          </p:cNvSpPr>
+          <p:nvPr/>
+        </p:nvSpPr>
+        <p:spPr>
+          <a:xfrm>
+            <a:off x="838200" y="1414170"/>
+            <a:ext cx="10515600" cy="1325563"/>
+          </a:xfrm>
+          <a:prstGeom prst="rect">
+            <a:avLst/>
+          </a:prstGeom>
+        </p:spPr>
+        <p:txBody>
+          <a:bodyPr vert="horz" lIns="91440" tIns="45720" rIns="91440" bIns="45720" rtlCol="0" anchor="ctr">
+            <a:normAutofit/>
+          </a:bodyPr>
+          <a:lstStyle>
+            <a:lvl1pPr algn="l" defTabSz="914400" rtl="0" eaLnBrk="1" latinLnBrk="0" hangingPunct="1">
+              <a:lnSpc>
+                <a:spcPct val="90000"/>
+              </a:lnSpc>
+              <a:spcBef>
+                <a:spcPct val="0"/>
+              </a:spcBef>
+              <a:buNone/>
+              <a:defRPr sz="4400" kern="1200">
+                <a:solidFill>
+                  <a:schemeClr val="tx1"/>
+                </a:solidFill>
+                <a:latin typeface="+mj-lt"/>
+                <a:ea typeface="+mj-ea"/>
+                <a:cs typeface="+mj-cs"/>
+              </a:defRPr>
+            </a:lvl1pPr>
+          </a:lstStyle>
+          <a:p>
+            <a:pPr lvl="1"/>
+            <a:r>
+              <a:rPr lang="en-US" altLang="zh-CN" sz="200" dirty="0"/>
+              <a:t>Benefit</a:t>
+            </a:r>
+            <a:r>
+              <a:rPr lang="zh-CN" altLang="en-US" sz="200" dirty="0"/>
+              <a:t>：</a:t>
+            </a:r>
+            <a:br>
+              <a:rPr lang="en-US" altLang="zh-CN" sz="200" dirty="0"/>
+            </a:br>
+            <a:endParaRPr lang="zh-CN" altLang="en-US" sz="200" dirty="0"/>
+          </a:p>
+        </p:txBody>
+      </p:sp>
+      <p:sp>
+        <p:nvSpPr>
+          <p:cNvPr id="5" name="标题 1">
+            <a:extLst>
+              <a:ext uri="{FF2B5EF4-FFF2-40B4-BE49-F238E27FC236}">
+                <a16:creationId xmlns:a16="http://schemas.microsoft.com/office/drawing/2014/main" id="{53C3A2E2-1A57-4233-9A5D-01B7559B2611}"/>
+              </a:ext>
+            </a:extLst>
+          </p:cNvPr>
+          <p:cNvSpPr txBox="1">
+            <a:spLocks/>
+          </p:cNvSpPr>
+          <p:nvPr/>
+        </p:nvSpPr>
+        <p:spPr>
+          <a:xfrm>
+            <a:off x="1327952" y="1538457"/>
+            <a:ext cx="10515600" cy="1325563"/>
+          </a:xfrm>
+          <a:prstGeom prst="rect">
+            <a:avLst/>
+          </a:prstGeom>
+        </p:spPr>
+        <p:txBody>
+          <a:bodyPr vert="horz" lIns="91440" tIns="45720" rIns="91440" bIns="45720" rtlCol="0" anchor="ctr">
+            <a:normAutofit/>
+          </a:bodyPr>
+          <a:lstStyle>
+            <a:lvl1pPr algn="l" defTabSz="914400" rtl="0" eaLnBrk="1" latinLnBrk="0" hangingPunct="1">
+              <a:lnSpc>
+                <a:spcPct val="90000"/>
+              </a:lnSpc>
+              <a:spcBef>
+                <a:spcPct val="0"/>
+              </a:spcBef>
+              <a:buNone/>
+              <a:defRPr sz="4400" kern="1200">
+                <a:solidFill>
+                  <a:schemeClr val="tx1"/>
+                </a:solidFill>
+                <a:latin typeface="+mj-lt"/>
+                <a:ea typeface="+mj-ea"/>
+                <a:cs typeface="+mj-cs"/>
+              </a:defRPr>
+            </a:lvl1pPr>
+          </a:lstStyle>
+          <a:p>
+            <a:r>
+              <a:rPr lang="en-US" altLang="zh-CN" sz="1600" dirty="0"/>
+              <a:t>1. Summation got</a:t>
+            </a:r>
+            <a:r>
+              <a:rPr lang="zh-CN" altLang="en-US" sz="1600" dirty="0"/>
+              <a:t> </a:t>
+            </a:r>
+            <a:r>
+              <a:rPr lang="en-US" altLang="zh-CN" sz="1600" dirty="0"/>
+              <a:t>better</a:t>
+            </a:r>
+            <a:r>
+              <a:rPr lang="zh-CN" altLang="en-US" sz="1600" dirty="0"/>
+              <a:t> </a:t>
+            </a:r>
+            <a:r>
+              <a:rPr lang="en-US" altLang="zh-CN" sz="1600" dirty="0"/>
+              <a:t>performance than concatenation, significantly reduce the computational load.</a:t>
+            </a:r>
+            <a:br>
+              <a:rPr lang="en-US" altLang="zh-CN" sz="2800" dirty="0"/>
+            </a:br>
+            <a:endParaRPr lang="zh-CN" altLang="en-US" sz="2800" dirty="0"/>
+          </a:p>
+        </p:txBody>
+      </p:sp>
+    </p:spTree>
+    <p:extLst>
+      <p:ext uri="{BB962C8B-B14F-4D97-AF65-F5344CB8AC3E}">
+        <p14:creationId xmlns:p14="http://schemas.microsoft.com/office/powerpoint/2010/main" val="3832600874"/>
       </p:ext>
     </p:extLst>
   </p:cSld>

</xml_diff>